<commit_message>
Added confidence and estimated plots for Q10
</commit_message>
<xml_diff>
--- a/analysis/images.pptx
+++ b/analysis/images.pptx
@@ -5,11 +5,12 @@
     <p:sldMasterId id="2147483648" r:id="rId1"/>
   </p:sldMasterIdLst>
   <p:notesMasterIdLst>
-    <p:notesMasterId r:id="rId4"/>
+    <p:notesMasterId r:id="rId5"/>
   </p:notesMasterIdLst>
   <p:sldIdLst>
     <p:sldId id="256" r:id="rId2"/>
     <p:sldId id="257" r:id="rId3"/>
+    <p:sldId id="259" r:id="rId4"/>
   </p:sldIdLst>
   <p:sldSz cx="12192000" cy="6858000"/>
   <p:notesSz cx="6858000" cy="9144000"/>
@@ -198,7 +199,7 @@
           <a:p>
             <a:fld id="{7FE9188B-10AF-FC47-BF54-AD59BE345B19}" type="datetimeFigureOut">
               <a:rPr lang="en-US" smtClean="0"/>
-              <a:t>12/9/17</a:t>
+              <a:t>12/10/17</a:t>
             </a:fld>
             <a:endParaRPr lang="en-US"/>
           </a:p>
@@ -597,7 +598,7 @@
           <a:p>
             <a:fld id="{A0D90C14-9F4F-9F45-A2BA-737B0479BD2B}" type="datetimeFigureOut">
               <a:rPr lang="en-US" smtClean="0"/>
-              <a:t>12/9/17</a:t>
+              <a:t>12/10/17</a:t>
             </a:fld>
             <a:endParaRPr lang="en-US"/>
           </a:p>
@@ -767,7 +768,7 @@
           <a:p>
             <a:fld id="{A0D90C14-9F4F-9F45-A2BA-737B0479BD2B}" type="datetimeFigureOut">
               <a:rPr lang="en-US" smtClean="0"/>
-              <a:t>12/9/17</a:t>
+              <a:t>12/10/17</a:t>
             </a:fld>
             <a:endParaRPr lang="en-US"/>
           </a:p>
@@ -947,7 +948,7 @@
           <a:p>
             <a:fld id="{A0D90C14-9F4F-9F45-A2BA-737B0479BD2B}" type="datetimeFigureOut">
               <a:rPr lang="en-US" smtClean="0"/>
-              <a:t>12/9/17</a:t>
+              <a:t>12/10/17</a:t>
             </a:fld>
             <a:endParaRPr lang="en-US"/>
           </a:p>
@@ -1117,7 +1118,7 @@
           <a:p>
             <a:fld id="{A0D90C14-9F4F-9F45-A2BA-737B0479BD2B}" type="datetimeFigureOut">
               <a:rPr lang="en-US" smtClean="0"/>
-              <a:t>12/9/17</a:t>
+              <a:t>12/10/17</a:t>
             </a:fld>
             <a:endParaRPr lang="en-US"/>
           </a:p>
@@ -1363,7 +1364,7 @@
           <a:p>
             <a:fld id="{A0D90C14-9F4F-9F45-A2BA-737B0479BD2B}" type="datetimeFigureOut">
               <a:rPr lang="en-US" smtClean="0"/>
-              <a:t>12/9/17</a:t>
+              <a:t>12/10/17</a:t>
             </a:fld>
             <a:endParaRPr lang="en-US"/>
           </a:p>
@@ -1595,7 +1596,7 @@
           <a:p>
             <a:fld id="{A0D90C14-9F4F-9F45-A2BA-737B0479BD2B}" type="datetimeFigureOut">
               <a:rPr lang="en-US" smtClean="0"/>
-              <a:t>12/9/17</a:t>
+              <a:t>12/10/17</a:t>
             </a:fld>
             <a:endParaRPr lang="en-US"/>
           </a:p>
@@ -1962,7 +1963,7 @@
           <a:p>
             <a:fld id="{A0D90C14-9F4F-9F45-A2BA-737B0479BD2B}" type="datetimeFigureOut">
               <a:rPr lang="en-US" smtClean="0"/>
-              <a:t>12/9/17</a:t>
+              <a:t>12/10/17</a:t>
             </a:fld>
             <a:endParaRPr lang="en-US"/>
           </a:p>
@@ -2080,7 +2081,7 @@
           <a:p>
             <a:fld id="{A0D90C14-9F4F-9F45-A2BA-737B0479BD2B}" type="datetimeFigureOut">
               <a:rPr lang="en-US" smtClean="0"/>
-              <a:t>12/9/17</a:t>
+              <a:t>12/10/17</a:t>
             </a:fld>
             <a:endParaRPr lang="en-US"/>
           </a:p>
@@ -2175,7 +2176,7 @@
           <a:p>
             <a:fld id="{A0D90C14-9F4F-9F45-A2BA-737B0479BD2B}" type="datetimeFigureOut">
               <a:rPr lang="en-US" smtClean="0"/>
-              <a:t>12/9/17</a:t>
+              <a:t>12/10/17</a:t>
             </a:fld>
             <a:endParaRPr lang="en-US"/>
           </a:p>
@@ -2452,7 +2453,7 @@
           <a:p>
             <a:fld id="{A0D90C14-9F4F-9F45-A2BA-737B0479BD2B}" type="datetimeFigureOut">
               <a:rPr lang="en-US" smtClean="0"/>
-              <a:t>12/9/17</a:t>
+              <a:t>12/10/17</a:t>
             </a:fld>
             <a:endParaRPr lang="en-US"/>
           </a:p>
@@ -2705,7 +2706,7 @@
           <a:p>
             <a:fld id="{A0D90C14-9F4F-9F45-A2BA-737B0479BD2B}" type="datetimeFigureOut">
               <a:rPr lang="en-US" smtClean="0"/>
-              <a:t>12/9/17</a:t>
+              <a:t>12/10/17</a:t>
             </a:fld>
             <a:endParaRPr lang="en-US"/>
           </a:p>
@@ -2918,7 +2919,7 @@
           <a:p>
             <a:fld id="{A0D90C14-9F4F-9F45-A2BA-737B0479BD2B}" type="datetimeFigureOut">
               <a:rPr lang="en-US" smtClean="0"/>
-              <a:t>12/9/17</a:t>
+              <a:t>12/10/17</a:t>
             </a:fld>
             <a:endParaRPr lang="en-US"/>
           </a:p>
@@ -3488,14 +3489,6 @@
 <file path=ppt/slides/slide2.xml><?xml version="1.0" encoding="utf-8"?>
 <p:sld xmlns:a="http://schemas.openxmlformats.org/drawingml/2006/main" xmlns:r="http://schemas.openxmlformats.org/officeDocument/2006/relationships" xmlns:p="http://schemas.openxmlformats.org/presentationml/2006/main">
   <p:cSld>
-    <p:bg>
-      <p:bgPr>
-        <a:solidFill>
-          <a:schemeClr val="bg1"/>
-        </a:solidFill>
-        <a:effectLst/>
-      </p:bgPr>
-    </p:bg>
     <p:spTree>
       <p:nvGrpSpPr>
         <p:cNvPr id="1" name=""/>
@@ -3512,7 +3505,7 @@
       </p:grpSpPr>
       <p:pic>
         <p:nvPicPr>
-          <p:cNvPr id="6" name="Picture 5"/>
+          <p:cNvPr id="2" name="Picture 1"/>
           <p:cNvPicPr>
             <a:picLocks noChangeAspect="1"/>
           </p:cNvPicPr>
@@ -3532,115 +3525,17 @@
         </p:blipFill>
         <p:spPr>
           <a:xfrm>
-            <a:off x="7160721" y="3671316"/>
-            <a:ext cx="3088130" cy="2553469"/>
+            <a:off x="1665578" y="48846"/>
+            <a:ext cx="4308477" cy="3562532"/>
           </a:xfrm>
           <a:prstGeom prst="rect">
             <a:avLst/>
           </a:prstGeom>
         </p:spPr>
       </p:pic>
-      <p:cxnSp>
-        <p:nvCxnSpPr>
-          <p:cNvPr id="14" name="Straight Connector 13">
-            <a:extLst>
-              <a:ext uri="{FF2B5EF4-FFF2-40B4-BE49-F238E27FC236}">
-                <a16:creationId xmlns:a16="http://schemas.microsoft.com/office/drawing/2014/main" xmlns="" id="{91B6081D-D3E8-4209-B85B-EB1C655A6272}"/>
-              </a:ext>
-            </a:extLst>
-          </p:cNvPr>
-          <p:cNvCxnSpPr>
-            <a:cxnSpLocks noGrp="1" noRot="1" noChangeAspect="1" noMove="1" noResize="1" noEditPoints="1" noAdjustHandles="1" noChangeArrowheads="1" noChangeShapeType="1"/>
-          </p:cNvCxnSpPr>
-          <p:nvPr>
-            <p:extLst>
-              <p:ext uri="{386F3935-93C4-4BCD-93E2-E3B085C9AB24}">
-                <p16:designElem xmlns:p16="http://schemas.microsoft.com/office/powerpoint/2015/main" val="1"/>
-              </p:ext>
-            </p:extLst>
-          </p:nvPr>
-        </p:nvCxnSpPr>
-        <p:spPr>
-          <a:xfrm>
-            <a:off x="6091214" y="1111170"/>
-            <a:ext cx="11040" cy="4645103"/>
-          </a:xfrm>
-          <a:prstGeom prst="line">
-            <a:avLst/>
-          </a:prstGeom>
-          <a:ln w="19050">
-            <a:solidFill>
-              <a:srgbClr val="7F7F7F"/>
-            </a:solidFill>
-          </a:ln>
-        </p:spPr>
-        <p:style>
-          <a:lnRef idx="1">
-            <a:schemeClr val="accent1"/>
-          </a:lnRef>
-          <a:fillRef idx="0">
-            <a:schemeClr val="accent1"/>
-          </a:fillRef>
-          <a:effectRef idx="0">
-            <a:schemeClr val="accent1"/>
-          </a:effectRef>
-          <a:fontRef idx="minor">
-            <a:schemeClr val="tx1"/>
-          </a:fontRef>
-        </p:style>
-      </p:cxnSp>
-      <p:cxnSp>
-        <p:nvCxnSpPr>
-          <p:cNvPr id="16" name="Straight Connector 15">
-            <a:extLst>
-              <a:ext uri="{FF2B5EF4-FFF2-40B4-BE49-F238E27FC236}">
-                <a16:creationId xmlns:a16="http://schemas.microsoft.com/office/drawing/2014/main" xmlns="" id="{28CA55E4-1295-45C8-BA05-5A9E705B749A}"/>
-              </a:ext>
-            </a:extLst>
-          </p:cNvPr>
-          <p:cNvCxnSpPr>
-            <a:cxnSpLocks noGrp="1" noRot="1" noChangeAspect="1" noMove="1" noResize="1" noEditPoints="1" noAdjustHandles="1" noChangeArrowheads="1" noChangeShapeType="1"/>
-          </p:cNvCxnSpPr>
-          <p:nvPr>
-            <p:extLst>
-              <p:ext uri="{386F3935-93C4-4BCD-93E2-E3B085C9AB24}">
-                <p16:designElem xmlns:p16="http://schemas.microsoft.com/office/powerpoint/2015/main" val="1"/>
-              </p:ext>
-            </p:extLst>
-          </p:nvPr>
-        </p:nvCxnSpPr>
-        <p:spPr>
-          <a:xfrm>
-            <a:off x="1403027" y="3428998"/>
-            <a:ext cx="4188904" cy="1"/>
-          </a:xfrm>
-          <a:prstGeom prst="line">
-            <a:avLst/>
-          </a:prstGeom>
-          <a:ln w="19050">
-            <a:solidFill>
-              <a:srgbClr val="7F7F7F"/>
-            </a:solidFill>
-          </a:ln>
-        </p:spPr>
-        <p:style>
-          <a:lnRef idx="1">
-            <a:schemeClr val="accent1"/>
-          </a:lnRef>
-          <a:fillRef idx="0">
-            <a:schemeClr val="accent1"/>
-          </a:fillRef>
-          <a:effectRef idx="0">
-            <a:schemeClr val="accent1"/>
-          </a:effectRef>
-          <a:fontRef idx="minor">
-            <a:schemeClr val="tx1"/>
-          </a:fontRef>
-        </p:style>
-      </p:cxnSp>
       <p:pic>
         <p:nvPicPr>
-          <p:cNvPr id="8" name="Picture 7"/>
+          <p:cNvPr id="3" name="Picture 2"/>
           <p:cNvPicPr>
             <a:picLocks noChangeAspect="1"/>
           </p:cNvPicPr>
@@ -3660,8 +3555,8 @@
         </p:blipFill>
         <p:spPr>
           <a:xfrm>
-            <a:off x="1923694" y="643467"/>
-            <a:ext cx="3135410" cy="2543217"/>
+            <a:off x="1665578" y="3611378"/>
+            <a:ext cx="4308477" cy="3494724"/>
           </a:xfrm>
           <a:prstGeom prst="rect">
             <a:avLst/>
@@ -3670,7 +3565,7 @@
       </p:pic>
       <p:pic>
         <p:nvPicPr>
-          <p:cNvPr id="7" name="Picture 6"/>
+          <p:cNvPr id="4" name="Picture 3"/>
           <p:cNvPicPr>
             <a:picLocks noChangeAspect="1"/>
           </p:cNvPicPr>
@@ -3690,66 +3585,17 @@
         </p:blipFill>
         <p:spPr>
           <a:xfrm>
-            <a:off x="7110181" y="643467"/>
-            <a:ext cx="3138670" cy="2545862"/>
+            <a:off x="6274361" y="136870"/>
+            <a:ext cx="4283552" cy="3474508"/>
           </a:xfrm>
           <a:prstGeom prst="rect">
             <a:avLst/>
           </a:prstGeom>
         </p:spPr>
       </p:pic>
-      <p:cxnSp>
-        <p:nvCxnSpPr>
-          <p:cNvPr id="18" name="Straight Connector 17">
-            <a:extLst>
-              <a:ext uri="{FF2B5EF4-FFF2-40B4-BE49-F238E27FC236}">
-                <a16:creationId xmlns:a16="http://schemas.microsoft.com/office/drawing/2014/main" xmlns="" id="{08C5794E-A9A1-4A23-AF68-C79A7822334C}"/>
-              </a:ext>
-            </a:extLst>
-          </p:cNvPr>
-          <p:cNvCxnSpPr>
-            <a:cxnSpLocks noGrp="1" noRot="1" noChangeAspect="1" noMove="1" noResize="1" noEditPoints="1" noAdjustHandles="1" noChangeArrowheads="1" noChangeShapeType="1"/>
-          </p:cNvCxnSpPr>
-          <p:nvPr>
-            <p:extLst>
-              <p:ext uri="{386F3935-93C4-4BCD-93E2-E3B085C9AB24}">
-                <p16:designElem xmlns:p16="http://schemas.microsoft.com/office/powerpoint/2015/main" val="1"/>
-              </p:ext>
-            </p:extLst>
-          </p:nvPr>
-        </p:nvCxnSpPr>
-        <p:spPr>
-          <a:xfrm>
-            <a:off x="6610334" y="3428998"/>
-            <a:ext cx="4188904" cy="1"/>
-          </a:xfrm>
-          <a:prstGeom prst="line">
-            <a:avLst/>
-          </a:prstGeom>
-          <a:ln w="19050">
-            <a:solidFill>
-              <a:srgbClr val="7F7F7F"/>
-            </a:solidFill>
-          </a:ln>
-        </p:spPr>
-        <p:style>
-          <a:lnRef idx="1">
-            <a:schemeClr val="accent1"/>
-          </a:lnRef>
-          <a:fillRef idx="0">
-            <a:schemeClr val="accent1"/>
-          </a:fillRef>
-          <a:effectRef idx="0">
-            <a:schemeClr val="accent1"/>
-          </a:effectRef>
-          <a:fontRef idx="minor">
-            <a:schemeClr val="tx1"/>
-          </a:fontRef>
-        </p:style>
-      </p:cxnSp>
       <p:pic>
         <p:nvPicPr>
-          <p:cNvPr id="10" name="Picture 9"/>
+          <p:cNvPr id="5" name="Picture 4"/>
           <p:cNvPicPr>
             <a:picLocks noChangeAspect="1"/>
           </p:cNvPicPr>
@@ -3769,8 +3615,8 @@
         </p:blipFill>
         <p:spPr>
           <a:xfrm>
-            <a:off x="1947877" y="3681568"/>
-            <a:ext cx="3135410" cy="2543217"/>
+            <a:off x="6274361" y="3611378"/>
+            <a:ext cx="4283552" cy="3474506"/>
           </a:xfrm>
           <a:prstGeom prst="rect">
             <a:avLst/>
@@ -3780,7 +3626,157 @@
     </p:spTree>
     <p:extLst>
       <p:ext uri="{BB962C8B-B14F-4D97-AF65-F5344CB8AC3E}">
-        <p14:creationId xmlns:p14="http://schemas.microsoft.com/office/powerpoint/2010/main" val="2817665221"/>
+        <p14:creationId xmlns:p14="http://schemas.microsoft.com/office/powerpoint/2010/main" val="1409128815"/>
+      </p:ext>
+    </p:extLst>
+  </p:cSld>
+  <p:clrMapOvr>
+    <a:masterClrMapping/>
+  </p:clrMapOvr>
+</p:sld>
+</file>
+
+<file path=ppt/slides/slide3.xml><?xml version="1.0" encoding="utf-8"?>
+<p:sld xmlns:a="http://schemas.openxmlformats.org/drawingml/2006/main" xmlns:r="http://schemas.openxmlformats.org/officeDocument/2006/relationships" xmlns:p="http://schemas.openxmlformats.org/presentationml/2006/main">
+  <p:cSld>
+    <p:spTree>
+      <p:nvGrpSpPr>
+        <p:cNvPr id="1" name=""/>
+        <p:cNvGrpSpPr/>
+        <p:nvPr/>
+      </p:nvGrpSpPr>
+      <p:grpSpPr>
+        <a:xfrm>
+          <a:off x="0" y="0"/>
+          <a:ext cx="0" cy="0"/>
+          <a:chOff x="0" y="0"/>
+          <a:chExt cx="0" cy="0"/>
+        </a:xfrm>
+      </p:grpSpPr>
+      <p:pic>
+        <p:nvPicPr>
+          <p:cNvPr id="2" name="Picture 1"/>
+          <p:cNvPicPr>
+            <a:picLocks noChangeAspect="1"/>
+          </p:cNvPicPr>
+          <p:nvPr/>
+        </p:nvPicPr>
+        <p:blipFill>
+          <a:blip r:embed="rId2">
+            <a:extLst>
+              <a:ext uri="{28A0092B-C50C-407E-A947-70E740481C1C}">
+                <a14:useLocalDpi xmlns:a14="http://schemas.microsoft.com/office/drawing/2010/main" val="0"/>
+              </a:ext>
+            </a:extLst>
+          </a:blip>
+          <a:stretch>
+            <a:fillRect/>
+          </a:stretch>
+        </p:blipFill>
+        <p:spPr>
+          <a:xfrm>
+            <a:off x="1897977" y="3696029"/>
+            <a:ext cx="4495731" cy="3646611"/>
+          </a:xfrm>
+          <a:prstGeom prst="rect">
+            <a:avLst/>
+          </a:prstGeom>
+        </p:spPr>
+      </p:pic>
+      <p:pic>
+        <p:nvPicPr>
+          <p:cNvPr id="3" name="Picture 2"/>
+          <p:cNvPicPr>
+            <a:picLocks noChangeAspect="1"/>
+          </p:cNvPicPr>
+          <p:nvPr/>
+        </p:nvPicPr>
+        <p:blipFill>
+          <a:blip r:embed="rId3">
+            <a:extLst>
+              <a:ext uri="{28A0092B-C50C-407E-A947-70E740481C1C}">
+                <a14:useLocalDpi xmlns:a14="http://schemas.microsoft.com/office/drawing/2010/main" val="0"/>
+              </a:ext>
+            </a:extLst>
+          </a:blip>
+          <a:stretch>
+            <a:fillRect/>
+          </a:stretch>
+        </p:blipFill>
+        <p:spPr>
+          <a:xfrm>
+            <a:off x="6667524" y="64059"/>
+            <a:ext cx="4477681" cy="3631970"/>
+          </a:xfrm>
+          <a:prstGeom prst="rect">
+            <a:avLst/>
+          </a:prstGeom>
+        </p:spPr>
+      </p:pic>
+      <p:pic>
+        <p:nvPicPr>
+          <p:cNvPr id="4" name="Picture 3"/>
+          <p:cNvPicPr>
+            <a:picLocks noChangeAspect="1"/>
+          </p:cNvPicPr>
+          <p:nvPr/>
+        </p:nvPicPr>
+        <p:blipFill>
+          <a:blip r:embed="rId4">
+            <a:extLst>
+              <a:ext uri="{28A0092B-C50C-407E-A947-70E740481C1C}">
+                <a14:useLocalDpi xmlns:a14="http://schemas.microsoft.com/office/drawing/2010/main" val="0"/>
+              </a:ext>
+            </a:extLst>
+          </a:blip>
+          <a:stretch>
+            <a:fillRect/>
+          </a:stretch>
+        </p:blipFill>
+        <p:spPr>
+          <a:xfrm>
+            <a:off x="1897977" y="64059"/>
+            <a:ext cx="4477681" cy="3631970"/>
+          </a:xfrm>
+          <a:prstGeom prst="rect">
+            <a:avLst/>
+          </a:prstGeom>
+        </p:spPr>
+      </p:pic>
+      <p:pic>
+        <p:nvPicPr>
+          <p:cNvPr id="5" name="Picture 4"/>
+          <p:cNvPicPr>
+            <a:picLocks noChangeAspect="1"/>
+          </p:cNvPicPr>
+          <p:nvPr/>
+        </p:nvPicPr>
+        <p:blipFill>
+          <a:blip r:embed="rId5">
+            <a:extLst>
+              <a:ext uri="{28A0092B-C50C-407E-A947-70E740481C1C}">
+                <a14:useLocalDpi xmlns:a14="http://schemas.microsoft.com/office/drawing/2010/main" val="0"/>
+              </a:ext>
+            </a:extLst>
+          </a:blip>
+          <a:stretch>
+            <a:fillRect/>
+          </a:stretch>
+        </p:blipFill>
+        <p:spPr>
+          <a:xfrm>
+            <a:off x="6662869" y="3706893"/>
+            <a:ext cx="4482336" cy="3635747"/>
+          </a:xfrm>
+          <a:prstGeom prst="rect">
+            <a:avLst/>
+          </a:prstGeom>
+        </p:spPr>
+      </p:pic>
+    </p:spTree>
+    <p:extLst>
+      <p:ext uri="{BB962C8B-B14F-4D97-AF65-F5344CB8AC3E}">
+        <p14:creationId xmlns:p14="http://schemas.microsoft.com/office/powerpoint/2010/main" val="1840473425"/>
       </p:ext>
     </p:extLst>
   </p:cSld>

</xml_diff>

<commit_message>
Added confidence-weighted voting method
</commit_message>
<xml_diff>
--- a/analysis/images.pptx
+++ b/analysis/images.pptx
@@ -5,12 +5,13 @@
     <p:sldMasterId id="2147483648" r:id="rId1"/>
   </p:sldMasterIdLst>
   <p:notesMasterIdLst>
-    <p:notesMasterId r:id="rId5"/>
+    <p:notesMasterId r:id="rId6"/>
   </p:notesMasterIdLst>
   <p:sldIdLst>
     <p:sldId id="256" r:id="rId2"/>
     <p:sldId id="257" r:id="rId3"/>
     <p:sldId id="259" r:id="rId4"/>
+    <p:sldId id="260" r:id="rId5"/>
   </p:sldIdLst>
   <p:sldSz cx="12192000" cy="6858000"/>
   <p:notesSz cx="6858000" cy="9144000"/>
@@ -3623,6 +3624,102 @@
           </a:prstGeom>
         </p:spPr>
       </p:pic>
+      <p:sp>
+        <p:nvSpPr>
+          <p:cNvPr id="6" name="TextBox 5"/>
+          <p:cNvSpPr txBox="1"/>
+          <p:nvPr/>
+        </p:nvSpPr>
+        <p:spPr>
+          <a:xfrm rot="16200000">
+            <a:off x="1215390" y="1615839"/>
+            <a:ext cx="561372" cy="230832"/>
+          </a:xfrm>
+          <a:prstGeom prst="rect">
+            <a:avLst/>
+          </a:prstGeom>
+          <a:noFill/>
+        </p:spPr>
+        <p:txBody>
+          <a:bodyPr wrap="none" rtlCol="0">
+            <a:spAutoFit/>
+          </a:bodyPr>
+          <a:lstStyle/>
+          <a:p>
+            <a:r>
+              <a:rPr lang="en-US" sz="900" smtClean="0">
+                <a:solidFill>
+                  <a:schemeClr val="bg2">
+                    <a:lumMod val="50000"/>
+                  </a:schemeClr>
+                </a:solidFill>
+                <a:latin typeface="Open Sans" charset="0"/>
+                <a:ea typeface="Open Sans" charset="0"/>
+                <a:cs typeface="Open Sans" charset="0"/>
+              </a:rPr>
+              <a:t>Counts</a:t>
+            </a:r>
+            <a:endParaRPr lang="en-US" sz="900">
+              <a:solidFill>
+                <a:schemeClr val="bg2">
+                  <a:lumMod val="50000"/>
+                </a:schemeClr>
+              </a:solidFill>
+              <a:latin typeface="Open Sans" charset="0"/>
+              <a:ea typeface="Open Sans" charset="0"/>
+              <a:cs typeface="Open Sans" charset="0"/>
+            </a:endParaRPr>
+          </a:p>
+        </p:txBody>
+      </p:sp>
+      <p:sp>
+        <p:nvSpPr>
+          <p:cNvPr id="7" name="TextBox 6"/>
+          <p:cNvSpPr txBox="1"/>
+          <p:nvPr/>
+        </p:nvSpPr>
+        <p:spPr>
+          <a:xfrm rot="16200000">
+            <a:off x="1216297" y="4948073"/>
+            <a:ext cx="561372" cy="230832"/>
+          </a:xfrm>
+          <a:prstGeom prst="rect">
+            <a:avLst/>
+          </a:prstGeom>
+          <a:noFill/>
+        </p:spPr>
+        <p:txBody>
+          <a:bodyPr wrap="none" rtlCol="0">
+            <a:spAutoFit/>
+          </a:bodyPr>
+          <a:lstStyle/>
+          <a:p>
+            <a:r>
+              <a:rPr lang="en-US" sz="900" smtClean="0">
+                <a:solidFill>
+                  <a:schemeClr val="bg2">
+                    <a:lumMod val="50000"/>
+                  </a:schemeClr>
+                </a:solidFill>
+                <a:latin typeface="Open Sans" charset="0"/>
+                <a:ea typeface="Open Sans" charset="0"/>
+                <a:cs typeface="Open Sans" charset="0"/>
+              </a:rPr>
+              <a:t>Counts</a:t>
+            </a:r>
+            <a:endParaRPr lang="en-US" sz="900">
+              <a:solidFill>
+                <a:schemeClr val="bg2">
+                  <a:lumMod val="50000"/>
+                </a:schemeClr>
+              </a:solidFill>
+              <a:latin typeface="Open Sans" charset="0"/>
+              <a:ea typeface="Open Sans" charset="0"/>
+              <a:cs typeface="Open Sans" charset="0"/>
+            </a:endParaRPr>
+          </a:p>
+        </p:txBody>
+      </p:sp>
     </p:spTree>
     <p:extLst>
       <p:ext uri="{BB962C8B-B14F-4D97-AF65-F5344CB8AC3E}">
@@ -3773,10 +3870,160 @@
           </a:prstGeom>
         </p:spPr>
       </p:pic>
+      <p:sp>
+        <p:nvSpPr>
+          <p:cNvPr id="6" name="TextBox 5"/>
+          <p:cNvSpPr txBox="1"/>
+          <p:nvPr/>
+        </p:nvSpPr>
+        <p:spPr>
+          <a:xfrm rot="16200000">
+            <a:off x="1486486" y="1641059"/>
+            <a:ext cx="561372" cy="230832"/>
+          </a:xfrm>
+          <a:prstGeom prst="rect">
+            <a:avLst/>
+          </a:prstGeom>
+          <a:noFill/>
+        </p:spPr>
+        <p:txBody>
+          <a:bodyPr wrap="none" rtlCol="0">
+            <a:spAutoFit/>
+          </a:bodyPr>
+          <a:lstStyle/>
+          <a:p>
+            <a:r>
+              <a:rPr lang="en-US" sz="900" smtClean="0">
+                <a:solidFill>
+                  <a:schemeClr val="bg2">
+                    <a:lumMod val="50000"/>
+                  </a:schemeClr>
+                </a:solidFill>
+                <a:latin typeface="Open Sans" charset="0"/>
+                <a:ea typeface="Open Sans" charset="0"/>
+                <a:cs typeface="Open Sans" charset="0"/>
+              </a:rPr>
+              <a:t>Counts</a:t>
+            </a:r>
+            <a:endParaRPr lang="en-US" sz="900">
+              <a:solidFill>
+                <a:schemeClr val="bg2">
+                  <a:lumMod val="50000"/>
+                </a:schemeClr>
+              </a:solidFill>
+              <a:latin typeface="Open Sans" charset="0"/>
+              <a:ea typeface="Open Sans" charset="0"/>
+              <a:cs typeface="Open Sans" charset="0"/>
+            </a:endParaRPr>
+          </a:p>
+        </p:txBody>
+      </p:sp>
+      <p:sp>
+        <p:nvSpPr>
+          <p:cNvPr id="7" name="TextBox 6"/>
+          <p:cNvSpPr txBox="1"/>
+          <p:nvPr/>
+        </p:nvSpPr>
+        <p:spPr>
+          <a:xfrm rot="16200000">
+            <a:off x="1474279" y="5403916"/>
+            <a:ext cx="561372" cy="230832"/>
+          </a:xfrm>
+          <a:prstGeom prst="rect">
+            <a:avLst/>
+          </a:prstGeom>
+          <a:noFill/>
+        </p:spPr>
+        <p:txBody>
+          <a:bodyPr wrap="none" rtlCol="0">
+            <a:spAutoFit/>
+          </a:bodyPr>
+          <a:lstStyle/>
+          <a:p>
+            <a:r>
+              <a:rPr lang="en-US" sz="900" smtClean="0">
+                <a:solidFill>
+                  <a:schemeClr val="bg2">
+                    <a:lumMod val="50000"/>
+                  </a:schemeClr>
+                </a:solidFill>
+                <a:latin typeface="Open Sans" charset="0"/>
+                <a:ea typeface="Open Sans" charset="0"/>
+                <a:cs typeface="Open Sans" charset="0"/>
+              </a:rPr>
+              <a:t>Counts</a:t>
+            </a:r>
+            <a:endParaRPr lang="en-US" sz="900">
+              <a:solidFill>
+                <a:schemeClr val="bg2">
+                  <a:lumMod val="50000"/>
+                </a:schemeClr>
+              </a:solidFill>
+              <a:latin typeface="Open Sans" charset="0"/>
+              <a:ea typeface="Open Sans" charset="0"/>
+              <a:cs typeface="Open Sans" charset="0"/>
+            </a:endParaRPr>
+          </a:p>
+        </p:txBody>
+      </p:sp>
     </p:spTree>
     <p:extLst>
       <p:ext uri="{BB962C8B-B14F-4D97-AF65-F5344CB8AC3E}">
         <p14:creationId xmlns:p14="http://schemas.microsoft.com/office/powerpoint/2010/main" val="1840473425"/>
+      </p:ext>
+    </p:extLst>
+  </p:cSld>
+  <p:clrMapOvr>
+    <a:masterClrMapping/>
+  </p:clrMapOvr>
+</p:sld>
+</file>
+
+<file path=ppt/slides/slide4.xml><?xml version="1.0" encoding="utf-8"?>
+<p:sld xmlns:a="http://schemas.openxmlformats.org/drawingml/2006/main" xmlns:r="http://schemas.openxmlformats.org/officeDocument/2006/relationships" xmlns:p="http://schemas.openxmlformats.org/presentationml/2006/main">
+  <p:cSld>
+    <p:spTree>
+      <p:nvGrpSpPr>
+        <p:cNvPr id="1" name=""/>
+        <p:cNvGrpSpPr/>
+        <p:nvPr/>
+      </p:nvGrpSpPr>
+      <p:grpSpPr>
+        <a:xfrm>
+          <a:off x="0" y="0"/>
+          <a:ext cx="0" cy="0"/>
+          <a:chOff x="0" y="0"/>
+          <a:chExt cx="0" cy="0"/>
+        </a:xfrm>
+      </p:grpSpPr>
+      <p:pic>
+        <p:nvPicPr>
+          <p:cNvPr id="2" name="Picture 1"/>
+          <p:cNvPicPr>
+            <a:picLocks noChangeAspect="1"/>
+          </p:cNvPicPr>
+          <p:nvPr/>
+        </p:nvPicPr>
+        <p:blipFill>
+          <a:blip r:embed="rId2"/>
+          <a:stretch>
+            <a:fillRect/>
+          </a:stretch>
+        </p:blipFill>
+        <p:spPr>
+          <a:xfrm>
+            <a:off x="0" y="170713"/>
+            <a:ext cx="12192000" cy="6516573"/>
+          </a:xfrm>
+          <a:prstGeom prst="rect">
+            <a:avLst/>
+          </a:prstGeom>
+        </p:spPr>
+      </p:pic>
+    </p:spTree>
+    <p:extLst>
+      <p:ext uri="{BB962C8B-B14F-4D97-AF65-F5344CB8AC3E}">
+        <p14:creationId xmlns:p14="http://schemas.microsoft.com/office/powerpoint/2010/main" val="785340134"/>
       </p:ext>
     </p:extLst>
   </p:cSld>

</xml_diff>